<commit_message>
Adding more to the paper presentation
</commit_message>
<xml_diff>
--- a/Paper/Fast R-CNN.pptx
+++ b/Paper/Fast R-CNN.pptx
@@ -7,10 +7,12 @@
   <p:sldIdLst>
     <p:sldId id="256" r:id="rId2"/>
     <p:sldId id="257" r:id="rId3"/>
-    <p:sldId id="258" r:id="rId4"/>
-    <p:sldId id="259" r:id="rId5"/>
-    <p:sldId id="260" r:id="rId6"/>
-    <p:sldId id="261" r:id="rId7"/>
+    <p:sldId id="263" r:id="rId4"/>
+    <p:sldId id="262" r:id="rId5"/>
+    <p:sldId id="258" r:id="rId6"/>
+    <p:sldId id="259" r:id="rId7"/>
+    <p:sldId id="260" r:id="rId8"/>
+    <p:sldId id="261" r:id="rId9"/>
   </p:sldIdLst>
   <p:sldSz cx="12192000" cy="6858000"/>
   <p:notesSz cx="6858000" cy="9144000"/>
@@ -264,7 +266,7 @@
           <a:p>
             <a:fld id="{03D13F2D-659F-4A55-BA9D-957F5FCD9257}" type="datetimeFigureOut">
               <a:rPr lang="en-US" smtClean="0"/>
-              <a:t>4/1/2021</a:t>
+              <a:t>4/18/2021</a:t>
             </a:fld>
             <a:endParaRPr lang="en-US"/>
           </a:p>
@@ -462,7 +464,7 @@
           <a:p>
             <a:fld id="{03D13F2D-659F-4A55-BA9D-957F5FCD9257}" type="datetimeFigureOut">
               <a:rPr lang="en-US" smtClean="0"/>
-              <a:t>4/1/2021</a:t>
+              <a:t>4/18/2021</a:t>
             </a:fld>
             <a:endParaRPr lang="en-US"/>
           </a:p>
@@ -670,7 +672,7 @@
           <a:p>
             <a:fld id="{03D13F2D-659F-4A55-BA9D-957F5FCD9257}" type="datetimeFigureOut">
               <a:rPr lang="en-US" smtClean="0"/>
-              <a:t>4/1/2021</a:t>
+              <a:t>4/18/2021</a:t>
             </a:fld>
             <a:endParaRPr lang="en-US"/>
           </a:p>
@@ -868,7 +870,7 @@
           <a:p>
             <a:fld id="{03D13F2D-659F-4A55-BA9D-957F5FCD9257}" type="datetimeFigureOut">
               <a:rPr lang="en-US" smtClean="0"/>
-              <a:t>4/1/2021</a:t>
+              <a:t>4/18/2021</a:t>
             </a:fld>
             <a:endParaRPr lang="en-US"/>
           </a:p>
@@ -1143,7 +1145,7 @@
           <a:p>
             <a:fld id="{03D13F2D-659F-4A55-BA9D-957F5FCD9257}" type="datetimeFigureOut">
               <a:rPr lang="en-US" smtClean="0"/>
-              <a:t>4/1/2021</a:t>
+              <a:t>4/18/2021</a:t>
             </a:fld>
             <a:endParaRPr lang="en-US"/>
           </a:p>
@@ -1408,7 +1410,7 @@
           <a:p>
             <a:fld id="{03D13F2D-659F-4A55-BA9D-957F5FCD9257}" type="datetimeFigureOut">
               <a:rPr lang="en-US" smtClean="0"/>
-              <a:t>4/1/2021</a:t>
+              <a:t>4/18/2021</a:t>
             </a:fld>
             <a:endParaRPr lang="en-US"/>
           </a:p>
@@ -1820,7 +1822,7 @@
           <a:p>
             <a:fld id="{03D13F2D-659F-4A55-BA9D-957F5FCD9257}" type="datetimeFigureOut">
               <a:rPr lang="en-US" smtClean="0"/>
-              <a:t>4/1/2021</a:t>
+              <a:t>4/18/2021</a:t>
             </a:fld>
             <a:endParaRPr lang="en-US"/>
           </a:p>
@@ -1961,7 +1963,7 @@
           <a:p>
             <a:fld id="{03D13F2D-659F-4A55-BA9D-957F5FCD9257}" type="datetimeFigureOut">
               <a:rPr lang="en-US" smtClean="0"/>
-              <a:t>4/1/2021</a:t>
+              <a:t>4/18/2021</a:t>
             </a:fld>
             <a:endParaRPr lang="en-US"/>
           </a:p>
@@ -2074,7 +2076,7 @@
           <a:p>
             <a:fld id="{03D13F2D-659F-4A55-BA9D-957F5FCD9257}" type="datetimeFigureOut">
               <a:rPr lang="en-US" smtClean="0"/>
-              <a:t>4/1/2021</a:t>
+              <a:t>4/18/2021</a:t>
             </a:fld>
             <a:endParaRPr lang="en-US"/>
           </a:p>
@@ -2385,7 +2387,7 @@
           <a:p>
             <a:fld id="{03D13F2D-659F-4A55-BA9D-957F5FCD9257}" type="datetimeFigureOut">
               <a:rPr lang="en-US" smtClean="0"/>
-              <a:t>4/1/2021</a:t>
+              <a:t>4/18/2021</a:t>
             </a:fld>
             <a:endParaRPr lang="en-US"/>
           </a:p>
@@ -2673,7 +2675,7 @@
           <a:p>
             <a:fld id="{03D13F2D-659F-4A55-BA9D-957F5FCD9257}" type="datetimeFigureOut">
               <a:rPr lang="en-US" smtClean="0"/>
-              <a:t>4/1/2021</a:t>
+              <a:t>4/18/2021</a:t>
             </a:fld>
             <a:endParaRPr lang="en-US"/>
           </a:p>
@@ -2914,7 +2916,7 @@
           <a:p>
             <a:fld id="{03D13F2D-659F-4A55-BA9D-957F5FCD9257}" type="datetimeFigureOut">
               <a:rPr lang="en-US" smtClean="0"/>
-              <a:t>4/1/2021</a:t>
+              <a:t>4/18/2021</a:t>
             </a:fld>
             <a:endParaRPr lang="en-US"/>
           </a:p>
@@ -3547,7 +3549,7 @@
           <p:cNvPr id="2" name="Title 1">
             <a:extLst>
               <a:ext uri="{FF2B5EF4-FFF2-40B4-BE49-F238E27FC236}">
-                <a16:creationId xmlns:a16="http://schemas.microsoft.com/office/drawing/2014/main" id="{9C3A7B7E-7EE1-408B-B686-FB580A1AB0A0}"/>
+                <a16:creationId xmlns:a16="http://schemas.microsoft.com/office/drawing/2014/main" id="{A5918626-C2FD-4D01-A8BF-DCEEF9582E20}"/>
               </a:ext>
             </a:extLst>
           </p:cNvPr>
@@ -3565,7 +3567,7 @@
           <a:p>
             <a:r>
               <a:rPr lang="en-US" dirty="0"/>
-              <a:t>Short Summary</a:t>
+              <a:t>What is CNN?</a:t>
             </a:r>
           </a:p>
         </p:txBody>
@@ -3575,7 +3577,7 @@
           <p:cNvPr id="3" name="Content Placeholder 2">
             <a:extLst>
               <a:ext uri="{FF2B5EF4-FFF2-40B4-BE49-F238E27FC236}">
-                <a16:creationId xmlns:a16="http://schemas.microsoft.com/office/drawing/2014/main" id="{A7F8374E-E94B-48BE-935A-63FD868342D4}"/>
+                <a16:creationId xmlns:a16="http://schemas.microsoft.com/office/drawing/2014/main" id="{5BA14961-3717-4740-9AF0-52F3D1414D00}"/>
               </a:ext>
             </a:extLst>
           </p:cNvPr>
@@ -3593,19 +3595,38 @@
           <a:p>
             <a:r>
               <a:rPr lang="en-US" dirty="0"/>
-              <a:t>Problems addressed:</a:t>
+              <a:t>Convolutional Neural Network</a:t>
             </a:r>
           </a:p>
           <a:p>
             <a:r>
               <a:rPr lang="en-US" dirty="0"/>
-              <a:t>Significance of the problems:</a:t>
+              <a:t>Input -&gt; Convolutional layer (transformed) -&gt; output</a:t>
             </a:r>
           </a:p>
           <a:p>
             <a:r>
               <a:rPr lang="en-US" dirty="0"/>
-              <a:t>Approach used to solve the problems:</a:t>
+              <a:t>Features</a:t>
+            </a:r>
+          </a:p>
+          <a:p>
+            <a:pPr lvl="1"/>
+            <a:r>
+              <a:rPr lang="en-US" dirty="0"/>
+              <a:t>Objects, textures, edges, shapes, etc.</a:t>
+            </a:r>
+          </a:p>
+          <a:p>
+            <a:r>
+              <a:rPr lang="en-US" dirty="0"/>
+              <a:t>Layers = Filters</a:t>
+            </a:r>
+          </a:p>
+          <a:p>
+            <a:r>
+              <a:rPr lang="en-US" dirty="0"/>
+              <a:t>Simple layers(edge 3x3) -&gt; intermediate layers(corners, shapes) -&gt; complicated layers(dog, cat)</a:t>
             </a:r>
           </a:p>
         </p:txBody>
@@ -3613,7 +3634,7 @@
     </p:spTree>
     <p:extLst>
       <p:ext uri="{BB962C8B-B14F-4D97-AF65-F5344CB8AC3E}">
-        <p14:creationId xmlns:p14="http://schemas.microsoft.com/office/powerpoint/2010/main" val="2525600589"/>
+        <p14:creationId xmlns:p14="http://schemas.microsoft.com/office/powerpoint/2010/main" val="4227201955"/>
       </p:ext>
     </p:extLst>
   </p:cSld>
@@ -3645,7 +3666,7 @@
           <p:cNvPr id="2" name="Title 1">
             <a:extLst>
               <a:ext uri="{FF2B5EF4-FFF2-40B4-BE49-F238E27FC236}">
-                <a16:creationId xmlns:a16="http://schemas.microsoft.com/office/drawing/2014/main" id="{19C82CCC-6D75-4055-815F-DDAD58C80BEE}"/>
+                <a16:creationId xmlns:a16="http://schemas.microsoft.com/office/drawing/2014/main" id="{E6566FFD-3A6C-4C51-BEDE-C2665D8B39C1}"/>
               </a:ext>
             </a:extLst>
           </p:cNvPr>
@@ -3663,7 +3684,7 @@
           <a:p>
             <a:r>
               <a:rPr lang="en-US" dirty="0"/>
-              <a:t>Assessment of strengths</a:t>
+              <a:t>What is R-CNN?</a:t>
             </a:r>
           </a:p>
         </p:txBody>
@@ -3673,7 +3694,7 @@
           <p:cNvPr id="3" name="Content Placeholder 2">
             <a:extLst>
               <a:ext uri="{FF2B5EF4-FFF2-40B4-BE49-F238E27FC236}">
-                <a16:creationId xmlns:a16="http://schemas.microsoft.com/office/drawing/2014/main" id="{00774AD3-767F-4055-99E4-0935A3DE504D}"/>
+                <a16:creationId xmlns:a16="http://schemas.microsoft.com/office/drawing/2014/main" id="{7A4C99A5-F247-4D14-9595-B1099DEB39F1}"/>
               </a:ext>
             </a:extLst>
           </p:cNvPr>
@@ -3691,15 +3712,83 @@
           <a:p>
             <a:r>
               <a:rPr lang="en-US" dirty="0"/>
-              <a:t>Why it was better than existing techniques at that time (2015)</a:t>
-            </a:r>
+              <a:t>Input image -&gt; selective search -&gt; initial segmentation -&gt; after many iteration -&gt; bounding box -&gt; into the CNN</a:t>
+            </a:r>
+          </a:p>
+          <a:p>
+            <a:r>
+              <a:rPr lang="en-US" dirty="0"/>
+              <a:t>Extract region proposal from bounding box -&gt; crop -&gt; CNN -&gt; classification</a:t>
+            </a:r>
+          </a:p>
+          <a:p>
+            <a:r>
+              <a:rPr lang="en-US" dirty="0">
+                <a:solidFill>
+                  <a:srgbClr val="FF0000"/>
+                </a:solidFill>
+              </a:rPr>
+              <a:t>Problem addressed:</a:t>
+            </a:r>
+          </a:p>
+          <a:p>
+            <a:pPr marL="457200" lvl="1" indent="0">
+              <a:buNone/>
+            </a:pPr>
+            <a:r>
+              <a:rPr lang="en-US" dirty="0">
+                <a:solidFill>
+                  <a:srgbClr val="FF0000"/>
+                </a:solidFill>
+              </a:rPr>
+              <a:t>Region loses detail when cropped to fit into the CNN.</a:t>
+            </a:r>
+          </a:p>
+          <a:p>
+            <a:pPr marL="457200" lvl="1" indent="0">
+              <a:buNone/>
+            </a:pPr>
+            <a:r>
+              <a:rPr lang="en-US" dirty="0">
+                <a:solidFill>
+                  <a:srgbClr val="FF0000"/>
+                </a:solidFill>
+              </a:rPr>
+              <a:t>There could be too much bounding box to pass to the CNN.</a:t>
+            </a:r>
+          </a:p>
+          <a:p>
+            <a:r>
+              <a:rPr lang="en-US" dirty="0"/>
+              <a:t>Significance of the problems:</a:t>
+            </a:r>
+          </a:p>
+          <a:p>
+            <a:pPr lvl="1"/>
+            <a:r>
+              <a:rPr lang="en-US">
+                <a:solidFill>
+                  <a:srgbClr val="FF0000"/>
+                </a:solidFill>
+              </a:rPr>
+              <a:t>Computationally </a:t>
+            </a:r>
+            <a:endParaRPr lang="en-US" dirty="0">
+              <a:solidFill>
+                <a:srgbClr val="FF0000"/>
+              </a:solidFill>
+            </a:endParaRPr>
+          </a:p>
+          <a:p>
+            <a:pPr lvl="1"/>
+            <a:endParaRPr lang="en-US" dirty="0"/>
           </a:p>
         </p:txBody>
       </p:sp>
     </p:spTree>
     <p:extLst>
       <p:ext uri="{BB962C8B-B14F-4D97-AF65-F5344CB8AC3E}">
-        <p14:creationId xmlns:p14="http://schemas.microsoft.com/office/powerpoint/2010/main" val="3886362596"/>
+        <p14:creationId xmlns:p14="http://schemas.microsoft.com/office/powerpoint/2010/main" val="4210663553"/>
       </p:ext>
     </p:extLst>
   </p:cSld>
@@ -3731,6 +3820,190 @@
           <p:cNvPr id="2" name="Title 1">
             <a:extLst>
               <a:ext uri="{FF2B5EF4-FFF2-40B4-BE49-F238E27FC236}">
+                <a16:creationId xmlns:a16="http://schemas.microsoft.com/office/drawing/2014/main" id="{9C3A7B7E-7EE1-408B-B686-FB580A1AB0A0}"/>
+              </a:ext>
+            </a:extLst>
+          </p:cNvPr>
+          <p:cNvSpPr>
+            <a:spLocks noGrp="1"/>
+          </p:cNvSpPr>
+          <p:nvPr>
+            <p:ph type="title"/>
+          </p:nvPr>
+        </p:nvSpPr>
+        <p:spPr/>
+        <p:txBody>
+          <a:bodyPr/>
+          <a:lstStyle/>
+          <a:p>
+            <a:r>
+              <a:rPr lang="en-US" dirty="0"/>
+              <a:t>Short Summary</a:t>
+            </a:r>
+          </a:p>
+        </p:txBody>
+      </p:sp>
+      <p:sp>
+        <p:nvSpPr>
+          <p:cNvPr id="3" name="Content Placeholder 2">
+            <a:extLst>
+              <a:ext uri="{FF2B5EF4-FFF2-40B4-BE49-F238E27FC236}">
+                <a16:creationId xmlns:a16="http://schemas.microsoft.com/office/drawing/2014/main" id="{A7F8374E-E94B-48BE-935A-63FD868342D4}"/>
+              </a:ext>
+            </a:extLst>
+          </p:cNvPr>
+          <p:cNvSpPr>
+            <a:spLocks noGrp="1"/>
+          </p:cNvSpPr>
+          <p:nvPr>
+            <p:ph idx="1"/>
+          </p:nvPr>
+        </p:nvSpPr>
+        <p:spPr/>
+        <p:txBody>
+          <a:bodyPr/>
+          <a:lstStyle/>
+          <a:p>
+            <a:r>
+              <a:rPr lang="en-US" dirty="0"/>
+              <a:t>Problems addressed:</a:t>
+            </a:r>
+          </a:p>
+          <a:p>
+            <a:r>
+              <a:rPr lang="en-US" dirty="0"/>
+              <a:t>Significance of the problems:</a:t>
+            </a:r>
+          </a:p>
+          <a:p>
+            <a:r>
+              <a:rPr lang="en-US" dirty="0"/>
+              <a:t>Approach used to solve the problems:</a:t>
+            </a:r>
+          </a:p>
+        </p:txBody>
+      </p:sp>
+    </p:spTree>
+    <p:extLst>
+      <p:ext uri="{BB962C8B-B14F-4D97-AF65-F5344CB8AC3E}">
+        <p14:creationId xmlns:p14="http://schemas.microsoft.com/office/powerpoint/2010/main" val="2525600589"/>
+      </p:ext>
+    </p:extLst>
+  </p:cSld>
+  <p:clrMapOvr>
+    <a:masterClrMapping/>
+  </p:clrMapOvr>
+</p:sld>
+</file>
+
+<file path=ppt/slides/slide6.xml><?xml version="1.0" encoding="utf-8"?>
+<p:sld xmlns:a="http://schemas.openxmlformats.org/drawingml/2006/main" xmlns:r="http://schemas.openxmlformats.org/officeDocument/2006/relationships" xmlns:p="http://schemas.openxmlformats.org/presentationml/2006/main">
+  <p:cSld>
+    <p:spTree>
+      <p:nvGrpSpPr>
+        <p:cNvPr id="1" name=""/>
+        <p:cNvGrpSpPr/>
+        <p:nvPr/>
+      </p:nvGrpSpPr>
+      <p:grpSpPr>
+        <a:xfrm>
+          <a:off x="0" y="0"/>
+          <a:ext cx="0" cy="0"/>
+          <a:chOff x="0" y="0"/>
+          <a:chExt cx="0" cy="0"/>
+        </a:xfrm>
+      </p:grpSpPr>
+      <p:sp>
+        <p:nvSpPr>
+          <p:cNvPr id="2" name="Title 1">
+            <a:extLst>
+              <a:ext uri="{FF2B5EF4-FFF2-40B4-BE49-F238E27FC236}">
+                <a16:creationId xmlns:a16="http://schemas.microsoft.com/office/drawing/2014/main" id="{19C82CCC-6D75-4055-815F-DDAD58C80BEE}"/>
+              </a:ext>
+            </a:extLst>
+          </p:cNvPr>
+          <p:cNvSpPr>
+            <a:spLocks noGrp="1"/>
+          </p:cNvSpPr>
+          <p:nvPr>
+            <p:ph type="title"/>
+          </p:nvPr>
+        </p:nvSpPr>
+        <p:spPr/>
+        <p:txBody>
+          <a:bodyPr/>
+          <a:lstStyle/>
+          <a:p>
+            <a:r>
+              <a:rPr lang="en-US" dirty="0"/>
+              <a:t>Assessment of strengths</a:t>
+            </a:r>
+          </a:p>
+        </p:txBody>
+      </p:sp>
+      <p:sp>
+        <p:nvSpPr>
+          <p:cNvPr id="3" name="Content Placeholder 2">
+            <a:extLst>
+              <a:ext uri="{FF2B5EF4-FFF2-40B4-BE49-F238E27FC236}">
+                <a16:creationId xmlns:a16="http://schemas.microsoft.com/office/drawing/2014/main" id="{00774AD3-767F-4055-99E4-0935A3DE504D}"/>
+              </a:ext>
+            </a:extLst>
+          </p:cNvPr>
+          <p:cNvSpPr>
+            <a:spLocks noGrp="1"/>
+          </p:cNvSpPr>
+          <p:nvPr>
+            <p:ph idx="1"/>
+          </p:nvPr>
+        </p:nvSpPr>
+        <p:spPr/>
+        <p:txBody>
+          <a:bodyPr/>
+          <a:lstStyle/>
+          <a:p>
+            <a:r>
+              <a:rPr lang="en-US" dirty="0"/>
+              <a:t>Why it was better than existing techniques at that time (2015)</a:t>
+            </a:r>
+          </a:p>
+        </p:txBody>
+      </p:sp>
+    </p:spTree>
+    <p:extLst>
+      <p:ext uri="{BB962C8B-B14F-4D97-AF65-F5344CB8AC3E}">
+        <p14:creationId xmlns:p14="http://schemas.microsoft.com/office/powerpoint/2010/main" val="3886362596"/>
+      </p:ext>
+    </p:extLst>
+  </p:cSld>
+  <p:clrMapOvr>
+    <a:masterClrMapping/>
+  </p:clrMapOvr>
+</p:sld>
+</file>
+
+<file path=ppt/slides/slide7.xml><?xml version="1.0" encoding="utf-8"?>
+<p:sld xmlns:a="http://schemas.openxmlformats.org/drawingml/2006/main" xmlns:r="http://schemas.openxmlformats.org/officeDocument/2006/relationships" xmlns:p="http://schemas.openxmlformats.org/presentationml/2006/main">
+  <p:cSld>
+    <p:spTree>
+      <p:nvGrpSpPr>
+        <p:cNvPr id="1" name=""/>
+        <p:cNvGrpSpPr/>
+        <p:nvPr/>
+      </p:nvGrpSpPr>
+      <p:grpSpPr>
+        <a:xfrm>
+          <a:off x="0" y="0"/>
+          <a:ext cx="0" cy="0"/>
+          <a:chOff x="0" y="0"/>
+          <a:chExt cx="0" cy="0"/>
+        </a:xfrm>
+      </p:grpSpPr>
+      <p:sp>
+        <p:nvSpPr>
+          <p:cNvPr id="2" name="Title 1">
+            <a:extLst>
+              <a:ext uri="{FF2B5EF4-FFF2-40B4-BE49-F238E27FC236}">
                 <a16:creationId xmlns:a16="http://schemas.microsoft.com/office/drawing/2014/main" id="{28E6A009-02DE-4BB4-8B73-F4234A45EE16}"/>
               </a:ext>
             </a:extLst>
@@ -3804,7 +4077,7 @@
 </p:sld>
 </file>
 
-<file path=ppt/slides/slide6.xml><?xml version="1.0" encoding="utf-8"?>
+<file path=ppt/slides/slide8.xml><?xml version="1.0" encoding="utf-8"?>
 <p:sld xmlns:a="http://schemas.openxmlformats.org/drawingml/2006/main" xmlns:r="http://schemas.openxmlformats.org/officeDocument/2006/relationships" xmlns:p="http://schemas.openxmlformats.org/presentationml/2006/main">
   <p:cSld>
     <p:spTree>

</xml_diff>